<commit_message>
rule of card number(in code)
</commit_message>
<xml_diff>
--- a/Image/SET 카드 그림.pptx
+++ b/Image/SET 카드 그림.pptx
@@ -5700,7 +5700,7 @@
           <p:nvPr>
             <p:extLst>
               <p:ext uri="{D42A27DB-BD31-4B8C-83A1-F6EECF244321}">
-                <p14:modId xmlns:p14="http://schemas.microsoft.com/office/powerpoint/2010/main" val="3337814365"/>
+                <p14:modId xmlns:p14="http://schemas.microsoft.com/office/powerpoint/2010/main" val="1983266524"/>
               </p:ext>
             </p:extLst>
           </p:nvPr>
@@ -5752,7 +5752,7 @@
                     <a:lstStyle/>
                     <a:p>
                       <a:pPr algn="r" latinLnBrk="1"/>
-                      <a:endParaRPr lang="ko-KR" altLang="en-US" dirty="0"/>
+                      <a:endParaRPr lang="ko-KR" altLang="en-US" b="1" dirty="0"/>
                     </a:p>
                   </a:txBody>
                   <a:tcPr/>
@@ -5764,10 +5764,10 @@
                     <a:p>
                       <a:pPr algn="r" latinLnBrk="1"/>
                       <a:r>
-                        <a:rPr lang="en-US" altLang="ko-KR" dirty="0"/>
+                        <a:rPr lang="en-US" altLang="ko-KR" b="1" dirty="0"/>
                         <a:t>1</a:t>
                       </a:r>
-                      <a:endParaRPr lang="ko-KR" altLang="en-US" dirty="0"/>
+                      <a:endParaRPr lang="ko-KR" altLang="en-US" b="1" dirty="0"/>
                     </a:p>
                   </a:txBody>
                   <a:tcPr/>
@@ -5779,10 +5779,10 @@
                     <a:p>
                       <a:pPr algn="r" latinLnBrk="1"/>
                       <a:r>
-                        <a:rPr lang="en-US" altLang="ko-KR" dirty="0"/>
+                        <a:rPr lang="en-US" altLang="ko-KR" b="1" dirty="0"/>
                         <a:t>2</a:t>
                       </a:r>
-                      <a:endParaRPr lang="ko-KR" altLang="en-US" dirty="0"/>
+                      <a:endParaRPr lang="ko-KR" altLang="en-US" b="1" dirty="0"/>
                     </a:p>
                   </a:txBody>
                   <a:tcPr/>
@@ -5794,10 +5794,10 @@
                     <a:p>
                       <a:pPr algn="r" latinLnBrk="1"/>
                       <a:r>
-                        <a:rPr lang="en-US" altLang="ko-KR" dirty="0"/>
+                        <a:rPr lang="en-US" altLang="ko-KR" b="1" dirty="0"/>
                         <a:t>3</a:t>
                       </a:r>
-                      <a:endParaRPr lang="ko-KR" altLang="en-US" dirty="0"/>
+                      <a:endParaRPr lang="ko-KR" altLang="en-US" b="1" dirty="0"/>
                     </a:p>
                   </a:txBody>
                   <a:tcPr/>
@@ -5816,10 +5816,10 @@
                     <a:p>
                       <a:pPr algn="r" latinLnBrk="1"/>
                       <a:r>
-                        <a:rPr lang="en-US" altLang="ko-KR" dirty="0"/>
+                        <a:rPr lang="en-US" altLang="ko-KR" b="1" dirty="0"/>
                         <a:t>Count</a:t>
                       </a:r>
-                      <a:endParaRPr lang="ko-KR" altLang="en-US" dirty="0"/>
+                      <a:endParaRPr lang="ko-KR" altLang="en-US" b="1" dirty="0"/>
                     </a:p>
                   </a:txBody>
                   <a:tcPr/>
@@ -5831,10 +5831,10 @@
                     <a:p>
                       <a:pPr algn="r" latinLnBrk="1"/>
                       <a:r>
-                        <a:rPr lang="en-US" altLang="ko-KR" dirty="0"/>
+                        <a:rPr lang="en-US" altLang="ko-KR" b="1" dirty="0"/>
                         <a:t>1</a:t>
                       </a:r>
-                      <a:endParaRPr lang="ko-KR" altLang="en-US" dirty="0"/>
+                      <a:endParaRPr lang="ko-KR" altLang="en-US" b="1" dirty="0"/>
                     </a:p>
                   </a:txBody>
                   <a:tcPr/>
@@ -5846,10 +5846,10 @@
                     <a:p>
                       <a:pPr algn="r" latinLnBrk="1"/>
                       <a:r>
-                        <a:rPr lang="en-US" altLang="ko-KR" dirty="0"/>
+                        <a:rPr lang="en-US" altLang="ko-KR" b="1" dirty="0"/>
                         <a:t>2</a:t>
                       </a:r>
-                      <a:endParaRPr lang="ko-KR" altLang="en-US" dirty="0"/>
+                      <a:endParaRPr lang="ko-KR" altLang="en-US" b="1" dirty="0"/>
                     </a:p>
                   </a:txBody>
                   <a:tcPr/>
@@ -5861,10 +5861,10 @@
                     <a:p>
                       <a:pPr algn="r" latinLnBrk="1"/>
                       <a:r>
-                        <a:rPr lang="en-US" altLang="ko-KR" dirty="0"/>
+                        <a:rPr lang="en-US" altLang="ko-KR" b="1" dirty="0"/>
                         <a:t>3</a:t>
                       </a:r>
-                      <a:endParaRPr lang="ko-KR" altLang="en-US" dirty="0"/>
+                      <a:endParaRPr lang="ko-KR" altLang="en-US" b="1" dirty="0"/>
                     </a:p>
                   </a:txBody>
                   <a:tcPr/>
@@ -5883,10 +5883,10 @@
                     <a:p>
                       <a:pPr algn="r" latinLnBrk="1"/>
                       <a:r>
-                        <a:rPr lang="en-US" altLang="ko-KR" dirty="0"/>
+                        <a:rPr lang="en-US" altLang="ko-KR" b="1" dirty="0"/>
                         <a:t>Shape</a:t>
                       </a:r>
-                      <a:endParaRPr lang="ko-KR" altLang="en-US" dirty="0"/>
+                      <a:endParaRPr lang="ko-KR" altLang="en-US" b="1" dirty="0"/>
                     </a:p>
                   </a:txBody>
                   <a:tcPr/>
@@ -5898,10 +5898,10 @@
                     <a:p>
                       <a:pPr algn="r" latinLnBrk="1"/>
                       <a:r>
-                        <a:rPr lang="en-US" altLang="ko-KR" dirty="0"/>
+                        <a:rPr lang="en-US" altLang="ko-KR" b="1" dirty="0"/>
                         <a:t>Circle</a:t>
                       </a:r>
-                      <a:endParaRPr lang="ko-KR" altLang="en-US" dirty="0"/>
+                      <a:endParaRPr lang="ko-KR" altLang="en-US" b="1" dirty="0"/>
                     </a:p>
                   </a:txBody>
                   <a:tcPr/>
@@ -5913,10 +5913,10 @@
                     <a:p>
                       <a:pPr algn="r" latinLnBrk="1"/>
                       <a:r>
-                        <a:rPr lang="en-US" altLang="ko-KR" dirty="0"/>
+                        <a:rPr lang="en-US" altLang="ko-KR" b="1" dirty="0"/>
                         <a:t>Square</a:t>
                       </a:r>
-                      <a:endParaRPr lang="ko-KR" altLang="en-US" dirty="0"/>
+                      <a:endParaRPr lang="ko-KR" altLang="en-US" b="1" dirty="0"/>
                     </a:p>
                   </a:txBody>
                   <a:tcPr/>
@@ -5928,10 +5928,10 @@
                     <a:p>
                       <a:pPr algn="r" latinLnBrk="1"/>
                       <a:r>
-                        <a:rPr lang="en-US" altLang="ko-KR" dirty="0"/>
+                        <a:rPr lang="en-US" altLang="ko-KR" b="1" dirty="0"/>
                         <a:t>Star</a:t>
                       </a:r>
-                      <a:endParaRPr lang="ko-KR" altLang="en-US" dirty="0"/>
+                      <a:endParaRPr lang="ko-KR" altLang="en-US" b="1" dirty="0"/>
                     </a:p>
                   </a:txBody>
                   <a:tcPr/>
@@ -5950,10 +5950,10 @@
                     <a:p>
                       <a:pPr algn="r" latinLnBrk="1"/>
                       <a:r>
-                        <a:rPr lang="en-US" altLang="ko-KR" dirty="0"/>
+                        <a:rPr lang="en-US" altLang="ko-KR" b="1" dirty="0"/>
                         <a:t>Pattern</a:t>
                       </a:r>
-                      <a:endParaRPr lang="ko-KR" altLang="en-US" dirty="0"/>
+                      <a:endParaRPr lang="ko-KR" altLang="en-US" b="1" dirty="0"/>
                     </a:p>
                   </a:txBody>
                   <a:tcPr/>
@@ -5965,10 +5965,10 @@
                     <a:p>
                       <a:pPr algn="r" latinLnBrk="1"/>
                       <a:r>
-                        <a:rPr lang="en-US" altLang="ko-KR" dirty="0"/>
+                        <a:rPr lang="en-US" altLang="ko-KR" b="1" dirty="0"/>
                         <a:t>None</a:t>
                       </a:r>
-                      <a:endParaRPr lang="ko-KR" altLang="en-US" dirty="0"/>
+                      <a:endParaRPr lang="ko-KR" altLang="en-US" b="1" dirty="0"/>
                     </a:p>
                   </a:txBody>
                   <a:tcPr/>
@@ -5980,10 +5980,10 @@
                     <a:p>
                       <a:pPr algn="r" latinLnBrk="1"/>
                       <a:r>
-                        <a:rPr lang="en-US" altLang="ko-KR" dirty="0"/>
+                        <a:rPr lang="en-US" altLang="ko-KR" b="1" dirty="0"/>
                         <a:t>Hatching</a:t>
                       </a:r>
-                      <a:endParaRPr lang="ko-KR" altLang="en-US" dirty="0"/>
+                      <a:endParaRPr lang="ko-KR" altLang="en-US" b="1" dirty="0"/>
                     </a:p>
                   </a:txBody>
                   <a:tcPr/>
@@ -5995,10 +5995,10 @@
                     <a:p>
                       <a:pPr algn="r" latinLnBrk="1"/>
                       <a:r>
-                        <a:rPr lang="en-US" altLang="ko-KR" dirty="0"/>
+                        <a:rPr lang="en-US" altLang="ko-KR" b="1" dirty="0"/>
                         <a:t>Full</a:t>
                       </a:r>
-                      <a:endParaRPr lang="ko-KR" altLang="en-US" dirty="0"/>
+                      <a:endParaRPr lang="ko-KR" altLang="en-US" b="1" dirty="0"/>
                     </a:p>
                   </a:txBody>
                   <a:tcPr/>
@@ -6017,10 +6017,10 @@
                     <a:p>
                       <a:pPr algn="r" latinLnBrk="1"/>
                       <a:r>
-                        <a:rPr lang="en-US" altLang="ko-KR" dirty="0"/>
+                        <a:rPr lang="en-US" altLang="ko-KR" b="1" dirty="0"/>
                         <a:t>Color</a:t>
                       </a:r>
-                      <a:endParaRPr lang="ko-KR" altLang="en-US" dirty="0"/>
+                      <a:endParaRPr lang="ko-KR" altLang="en-US" b="1" dirty="0"/>
                     </a:p>
                   </a:txBody>
                   <a:tcPr/>
@@ -6032,14 +6032,14 @@
                     <a:p>
                       <a:pPr algn="r" latinLnBrk="1"/>
                       <a:r>
-                        <a:rPr lang="en-US" altLang="ko-KR" dirty="0">
+                        <a:rPr lang="en-US" altLang="ko-KR" b="1" dirty="0">
                           <a:solidFill>
                             <a:srgbClr val="7030A0"/>
                           </a:solidFill>
                         </a:rPr>
                         <a:t>Purple</a:t>
                       </a:r>
-                      <a:endParaRPr lang="ko-KR" altLang="en-US" dirty="0">
+                      <a:endParaRPr lang="ko-KR" altLang="en-US" b="1" dirty="0">
                         <a:solidFill>
                           <a:srgbClr val="7030A0"/>
                         </a:solidFill>
@@ -6055,14 +6055,14 @@
                     <a:p>
                       <a:pPr algn="r" latinLnBrk="1"/>
                       <a:r>
-                        <a:rPr lang="en-US" altLang="ko-KR" dirty="0">
+                        <a:rPr lang="en-US" altLang="ko-KR" b="1" dirty="0">
                           <a:solidFill>
                             <a:srgbClr val="FF0000"/>
                           </a:solidFill>
                         </a:rPr>
                         <a:t>Red</a:t>
                       </a:r>
-                      <a:endParaRPr lang="ko-KR" altLang="en-US" dirty="0">
+                      <a:endParaRPr lang="ko-KR" altLang="en-US" b="1" dirty="0">
                         <a:solidFill>
                           <a:srgbClr val="FF0000"/>
                         </a:solidFill>
@@ -6078,14 +6078,14 @@
                     <a:p>
                       <a:pPr algn="r" latinLnBrk="1"/>
                       <a:r>
-                        <a:rPr lang="en-US" altLang="ko-KR" dirty="0">
+                        <a:rPr lang="en-US" altLang="ko-KR" b="1" dirty="0">
                           <a:solidFill>
                             <a:srgbClr val="00B050"/>
                           </a:solidFill>
                         </a:rPr>
                         <a:t>Green</a:t>
                       </a:r>
-                      <a:endParaRPr lang="ko-KR" altLang="en-US" dirty="0">
+                      <a:endParaRPr lang="ko-KR" altLang="en-US" b="1" dirty="0">
                         <a:solidFill>
                           <a:srgbClr val="00B050"/>
                         </a:solidFill>

</xml_diff>